<commit_message>
correcting some graphs' labels
</commit_message>
<xml_diff>
--- a/presentation/Classifying r:History and r:AlternativeHistory posts.pptx
+++ b/presentation/Classifying r:History and r:AlternativeHistory posts.pptx
@@ -207,7 +207,7 @@
           <a:p>
             <a:fld id="{1E40ADD5-AE5C-7145-A940-2730753F9E4E}" type="datetimeFigureOut">
               <a:rPr lang="en-US" smtClean="0"/>
-              <a:t>4/27/24</a:t>
+              <a:t>4/29/24</a:t>
             </a:fld>
             <a:endParaRPr lang="en-US"/>
           </a:p>
@@ -705,7 +705,7 @@
           <a:p>
             <a:fld id="{AD535AD2-504F-D347-9A07-48D248EE4048}" type="datetimeFigureOut">
               <a:rPr lang="en-US" smtClean="0"/>
-              <a:t>4/27/24</a:t>
+              <a:t>4/29/24</a:t>
             </a:fld>
             <a:endParaRPr lang="en-US"/>
           </a:p>
@@ -903,7 +903,7 @@
           <a:p>
             <a:fld id="{AD535AD2-504F-D347-9A07-48D248EE4048}" type="datetimeFigureOut">
               <a:rPr lang="en-US" smtClean="0"/>
-              <a:t>4/27/24</a:t>
+              <a:t>4/29/24</a:t>
             </a:fld>
             <a:endParaRPr lang="en-US"/>
           </a:p>
@@ -1111,7 +1111,7 @@
           <a:p>
             <a:fld id="{AD535AD2-504F-D347-9A07-48D248EE4048}" type="datetimeFigureOut">
               <a:rPr lang="en-US" smtClean="0"/>
-              <a:t>4/27/24</a:t>
+              <a:t>4/29/24</a:t>
             </a:fld>
             <a:endParaRPr lang="en-US"/>
           </a:p>
@@ -1309,7 +1309,7 @@
           <a:p>
             <a:fld id="{AD535AD2-504F-D347-9A07-48D248EE4048}" type="datetimeFigureOut">
               <a:rPr lang="en-US" smtClean="0"/>
-              <a:t>4/27/24</a:t>
+              <a:t>4/29/24</a:t>
             </a:fld>
             <a:endParaRPr lang="en-US"/>
           </a:p>
@@ -1584,7 +1584,7 @@
           <a:p>
             <a:fld id="{AD535AD2-504F-D347-9A07-48D248EE4048}" type="datetimeFigureOut">
               <a:rPr lang="en-US" smtClean="0"/>
-              <a:t>4/27/24</a:t>
+              <a:t>4/29/24</a:t>
             </a:fld>
             <a:endParaRPr lang="en-US"/>
           </a:p>
@@ -1849,7 +1849,7 @@
           <a:p>
             <a:fld id="{AD535AD2-504F-D347-9A07-48D248EE4048}" type="datetimeFigureOut">
               <a:rPr lang="en-US" smtClean="0"/>
-              <a:t>4/27/24</a:t>
+              <a:t>4/29/24</a:t>
             </a:fld>
             <a:endParaRPr lang="en-US"/>
           </a:p>
@@ -2261,7 +2261,7 @@
           <a:p>
             <a:fld id="{AD535AD2-504F-D347-9A07-48D248EE4048}" type="datetimeFigureOut">
               <a:rPr lang="en-US" smtClean="0"/>
-              <a:t>4/27/24</a:t>
+              <a:t>4/29/24</a:t>
             </a:fld>
             <a:endParaRPr lang="en-US"/>
           </a:p>
@@ -2402,7 +2402,7 @@
           <a:p>
             <a:fld id="{AD535AD2-504F-D347-9A07-48D248EE4048}" type="datetimeFigureOut">
               <a:rPr lang="en-US" smtClean="0"/>
-              <a:t>4/27/24</a:t>
+              <a:t>4/29/24</a:t>
             </a:fld>
             <a:endParaRPr lang="en-US"/>
           </a:p>
@@ -2515,7 +2515,7 @@
           <a:p>
             <a:fld id="{AD535AD2-504F-D347-9A07-48D248EE4048}" type="datetimeFigureOut">
               <a:rPr lang="en-US" smtClean="0"/>
-              <a:t>4/27/24</a:t>
+              <a:t>4/29/24</a:t>
             </a:fld>
             <a:endParaRPr lang="en-US"/>
           </a:p>
@@ -2826,7 +2826,7 @@
           <a:p>
             <a:fld id="{AD535AD2-504F-D347-9A07-48D248EE4048}" type="datetimeFigureOut">
               <a:rPr lang="en-US" smtClean="0"/>
-              <a:t>4/27/24</a:t>
+              <a:t>4/29/24</a:t>
             </a:fld>
             <a:endParaRPr lang="en-US"/>
           </a:p>
@@ -3114,7 +3114,7 @@
           <a:p>
             <a:fld id="{AD535AD2-504F-D347-9A07-48D248EE4048}" type="datetimeFigureOut">
               <a:rPr lang="en-US" smtClean="0"/>
-              <a:t>4/27/24</a:t>
+              <a:t>4/29/24</a:t>
             </a:fld>
             <a:endParaRPr lang="en-US"/>
           </a:p>
@@ -3355,7 +3355,7 @@
           <a:p>
             <a:fld id="{AD535AD2-504F-D347-9A07-48D248EE4048}" type="datetimeFigureOut">
               <a:rPr lang="en-US" smtClean="0"/>
-              <a:t>4/27/24</a:t>
+              <a:t>4/29/24</a:t>
             </a:fld>
             <a:endParaRPr lang="en-US"/>
           </a:p>
@@ -5070,10 +5070,10 @@
       </p:sp>
       <p:pic>
         <p:nvPicPr>
-          <p:cNvPr id="14" name="Content Placeholder 13" descr="A graph of different colored lines&#10;&#10;Description automatically generated">
-            <a:extLst>
-              <a:ext uri="{FF2B5EF4-FFF2-40B4-BE49-F238E27FC236}">
-                <a16:creationId xmlns:a16="http://schemas.microsoft.com/office/drawing/2014/main" id="{DE675A9F-C94E-61A3-BF95-76D695AE7B18}"/>
+          <p:cNvPr id="6" name="Content Placeholder 5" descr="A graph of different colored bars&#10;&#10;Description automatically generated">
+            <a:extLst>
+              <a:ext uri="{FF2B5EF4-FFF2-40B4-BE49-F238E27FC236}">
+                <a16:creationId xmlns:a16="http://schemas.microsoft.com/office/drawing/2014/main" id="{552B0E71-10D2-C38D-59BE-B2DEC1613D0B}"/>
               </a:ext>
             </a:extLst>
           </p:cNvPr>
@@ -5099,10 +5099,10 @@
       </p:pic>
       <p:pic>
         <p:nvPicPr>
-          <p:cNvPr id="16" name="Content Placeholder 15" descr="A graph of different colored bars&#10;&#10;Description automatically generated">
-            <a:extLst>
-              <a:ext uri="{FF2B5EF4-FFF2-40B4-BE49-F238E27FC236}">
-                <a16:creationId xmlns:a16="http://schemas.microsoft.com/office/drawing/2014/main" id="{A0CB8161-E57D-BE09-7070-CE88A5B3BB3C}"/>
+          <p:cNvPr id="10" name="Content Placeholder 9" descr="A graph of different colored lines&#10;&#10;Description automatically generated">
+            <a:extLst>
+              <a:ext uri="{FF2B5EF4-FFF2-40B4-BE49-F238E27FC236}">
+                <a16:creationId xmlns:a16="http://schemas.microsoft.com/office/drawing/2014/main" id="{8AFDEE4C-74D6-6F6A-9272-C6D3AE99A671}"/>
               </a:ext>
             </a:extLst>
           </p:cNvPr>

</xml_diff>